<commit_message>
Agregados las interfaces y el mapa
</commit_message>
<xml_diff>
--- a/fase_2.pptx
+++ b/fase_2.pptx
@@ -6,16 +6,18 @@
     <p:sldMasterId id="2147483662" r:id="rId2"/>
   </p:sldMasterIdLst>
   <p:notesMasterIdLst>
-    <p:notesMasterId r:id="rId10"/>
+    <p:notesMasterId r:id="rId12"/>
   </p:notesMasterIdLst>
   <p:sldIdLst>
     <p:sldId id="269" r:id="rId3"/>
-    <p:sldId id="264" r:id="rId4"/>
-    <p:sldId id="265" r:id="rId5"/>
-    <p:sldId id="266" r:id="rId6"/>
-    <p:sldId id="267" r:id="rId7"/>
-    <p:sldId id="268" r:id="rId8"/>
-    <p:sldId id="270" r:id="rId9"/>
+    <p:sldId id="270" r:id="rId4"/>
+    <p:sldId id="264" r:id="rId5"/>
+    <p:sldId id="265" r:id="rId6"/>
+    <p:sldId id="266" r:id="rId7"/>
+    <p:sldId id="267" r:id="rId8"/>
+    <p:sldId id="268" r:id="rId9"/>
+    <p:sldId id="272" r:id="rId10"/>
+    <p:sldId id="273" r:id="rId11"/>
   </p:sldIdLst>
   <p:sldSz cx="12192000" cy="6858000"/>
   <p:notesSz cx="6858000" cy="9144000"/>
@@ -680,7 +682,7 @@
     </p:spTree>
     <p:extLst>
       <p:ext uri="{BB962C8B-B14F-4D97-AF65-F5344CB8AC3E}">
-        <p14:creationId xmlns:p14="http://schemas.microsoft.com/office/powerpoint/2010/main" val="1342743426"/>
+        <p14:creationId xmlns:p14="http://schemas.microsoft.com/office/powerpoint/2010/main" val="2471460547"/>
       </p:ext>
     </p:extLst>
   </p:cSld>
@@ -695,7 +697,7 @@
   <p:cSld>
     <p:spTree>
       <p:nvGrpSpPr>
-        <p:cNvPr id="1" name="Shape 145"/>
+        <p:cNvPr id="1" name="Shape 139"/>
         <p:cNvGrpSpPr/>
         <p:nvPr/>
       </p:nvGrpSpPr>
@@ -709,7 +711,7 @@
       </p:grpSpPr>
       <p:sp>
         <p:nvSpPr>
-          <p:cNvPr id="146" name="Shape 146"/>
+          <p:cNvPr id="140" name="Shape 140"/>
           <p:cNvSpPr>
             <a:spLocks noGrp="1" noRot="1" noChangeAspect="1"/>
           </p:cNvSpPr>
@@ -750,7 +752,7 @@
       </p:sp>
       <p:sp>
         <p:nvSpPr>
-          <p:cNvPr id="147" name="Shape 147"/>
+          <p:cNvPr id="141" name="Shape 141"/>
           <p:cNvSpPr txBox="1">
             <a:spLocks noGrp="1"/>
           </p:cNvSpPr>
@@ -789,7 +791,7 @@
     </p:spTree>
     <p:extLst>
       <p:ext uri="{BB962C8B-B14F-4D97-AF65-F5344CB8AC3E}">
-        <p14:creationId xmlns:p14="http://schemas.microsoft.com/office/powerpoint/2010/main" val="2325733571"/>
+        <p14:creationId xmlns:p14="http://schemas.microsoft.com/office/powerpoint/2010/main" val="1342743426"/>
       </p:ext>
     </p:extLst>
   </p:cSld>
@@ -898,7 +900,7 @@
     </p:spTree>
     <p:extLst>
       <p:ext uri="{BB962C8B-B14F-4D97-AF65-F5344CB8AC3E}">
-        <p14:creationId xmlns:p14="http://schemas.microsoft.com/office/powerpoint/2010/main" val="2410617924"/>
+        <p14:creationId xmlns:p14="http://schemas.microsoft.com/office/powerpoint/2010/main" val="2325733571"/>
       </p:ext>
     </p:extLst>
   </p:cSld>
@@ -1007,7 +1009,7 @@
     </p:spTree>
     <p:extLst>
       <p:ext uri="{BB962C8B-B14F-4D97-AF65-F5344CB8AC3E}">
-        <p14:creationId xmlns:p14="http://schemas.microsoft.com/office/powerpoint/2010/main" val="4162932517"/>
+        <p14:creationId xmlns:p14="http://schemas.microsoft.com/office/powerpoint/2010/main" val="2410617924"/>
       </p:ext>
     </p:extLst>
   </p:cSld>
@@ -1116,7 +1118,7 @@
     </p:spTree>
     <p:extLst>
       <p:ext uri="{BB962C8B-B14F-4D97-AF65-F5344CB8AC3E}">
-        <p14:creationId xmlns:p14="http://schemas.microsoft.com/office/powerpoint/2010/main" val="3256799418"/>
+        <p14:creationId xmlns:p14="http://schemas.microsoft.com/office/powerpoint/2010/main" val="4162932517"/>
       </p:ext>
     </p:extLst>
   </p:cSld>
@@ -1131,7 +1133,7 @@
   <p:cSld>
     <p:spTree>
       <p:nvGrpSpPr>
-        <p:cNvPr id="1" name="Shape 139"/>
+        <p:cNvPr id="1" name="Shape 145"/>
         <p:cNvGrpSpPr/>
         <p:nvPr/>
       </p:nvGrpSpPr>
@@ -1145,7 +1147,7 @@
       </p:grpSpPr>
       <p:sp>
         <p:nvSpPr>
-          <p:cNvPr id="140" name="Shape 140"/>
+          <p:cNvPr id="146" name="Shape 146"/>
           <p:cNvSpPr>
             <a:spLocks noGrp="1" noRot="1" noChangeAspect="1"/>
           </p:cNvSpPr>
@@ -1186,7 +1188,7 @@
       </p:sp>
       <p:sp>
         <p:nvSpPr>
-          <p:cNvPr id="141" name="Shape 141"/>
+          <p:cNvPr id="147" name="Shape 147"/>
           <p:cNvSpPr txBox="1">
             <a:spLocks noGrp="1"/>
           </p:cNvSpPr>
@@ -1225,7 +1227,225 @@
     </p:spTree>
     <p:extLst>
       <p:ext uri="{BB962C8B-B14F-4D97-AF65-F5344CB8AC3E}">
-        <p14:creationId xmlns:p14="http://schemas.microsoft.com/office/powerpoint/2010/main" val="2471460547"/>
+        <p14:creationId xmlns:p14="http://schemas.microsoft.com/office/powerpoint/2010/main" val="3256799418"/>
+      </p:ext>
+    </p:extLst>
+  </p:cSld>
+  <p:clrMapOvr>
+    <a:masterClrMapping/>
+  </p:clrMapOvr>
+</p:notes>
+</file>
+
+<file path=ppt/notesSlides/notesSlide8.xml><?xml version="1.0" encoding="utf-8"?>
+<p:notes xmlns:a="http://schemas.openxmlformats.org/drawingml/2006/main" xmlns:r="http://schemas.openxmlformats.org/officeDocument/2006/relationships" xmlns:p="http://schemas.openxmlformats.org/presentationml/2006/main" showMasterSp="0" showMasterPhAnim="0">
+  <p:cSld>
+    <p:spTree>
+      <p:nvGrpSpPr>
+        <p:cNvPr id="1" name="Shape 139"/>
+        <p:cNvGrpSpPr/>
+        <p:nvPr/>
+      </p:nvGrpSpPr>
+      <p:grpSpPr>
+        <a:xfrm>
+          <a:off x="0" y="0"/>
+          <a:ext cx="0" cy="0"/>
+          <a:chOff x="0" y="0"/>
+          <a:chExt cx="0" cy="0"/>
+        </a:xfrm>
+      </p:grpSpPr>
+      <p:sp>
+        <p:nvSpPr>
+          <p:cNvPr id="140" name="Shape 140"/>
+          <p:cNvSpPr>
+            <a:spLocks noGrp="1" noRot="1" noChangeAspect="1"/>
+          </p:cNvSpPr>
+          <p:nvPr>
+            <p:ph type="sldImg" idx="2"/>
+          </p:nvPr>
+        </p:nvSpPr>
+        <p:spPr>
+          <a:xfrm>
+            <a:off x="381000" y="685800"/>
+            <a:ext cx="6096000" cy="3429000"/>
+          </a:xfrm>
+          <a:custGeom>
+            <a:avLst/>
+            <a:gdLst/>
+            <a:ahLst/>
+            <a:cxnLst/>
+            <a:rect l="0" t="0" r="0" b="0"/>
+            <a:pathLst>
+              <a:path w="120000" h="120000" extrusionOk="0">
+                <a:moveTo>
+                  <a:pt x="0" y="0"/>
+                </a:moveTo>
+                <a:lnTo>
+                  <a:pt x="120000" y="0"/>
+                </a:lnTo>
+                <a:lnTo>
+                  <a:pt x="120000" y="120000"/>
+                </a:lnTo>
+                <a:lnTo>
+                  <a:pt x="0" y="120000"/>
+                </a:lnTo>
+                <a:close/>
+              </a:path>
+            </a:pathLst>
+          </a:custGeom>
+        </p:spPr>
+      </p:sp>
+      <p:sp>
+        <p:nvSpPr>
+          <p:cNvPr id="141" name="Shape 141"/>
+          <p:cNvSpPr txBox="1">
+            <a:spLocks noGrp="1"/>
+          </p:cNvSpPr>
+          <p:nvPr>
+            <p:ph type="body" idx="1"/>
+          </p:nvPr>
+        </p:nvSpPr>
+        <p:spPr>
+          <a:xfrm>
+            <a:off x="685800" y="4343400"/>
+            <a:ext cx="5486400" cy="4114800"/>
+          </a:xfrm>
+          <a:prstGeom prst="rect">
+            <a:avLst/>
+          </a:prstGeom>
+        </p:spPr>
+        <p:txBody>
+          <a:bodyPr spcFirstLastPara="1" wrap="square" lIns="91425" tIns="91425" rIns="91425" bIns="91425" anchor="t" anchorCtr="0">
+            <a:noAutofit/>
+          </a:bodyPr>
+          <a:lstStyle/>
+          <a:p>
+            <a:pPr marL="0" lvl="0" indent="0">
+              <a:spcBef>
+                <a:spcPts val="0"/>
+              </a:spcBef>
+              <a:spcAft>
+                <a:spcPts val="0"/>
+              </a:spcAft>
+              <a:buNone/>
+            </a:pPr>
+            <a:endParaRPr/>
+          </a:p>
+        </p:txBody>
+      </p:sp>
+    </p:spTree>
+    <p:extLst>
+      <p:ext uri="{BB962C8B-B14F-4D97-AF65-F5344CB8AC3E}">
+        <p14:creationId xmlns:p14="http://schemas.microsoft.com/office/powerpoint/2010/main" val="156015690"/>
+      </p:ext>
+    </p:extLst>
+  </p:cSld>
+  <p:clrMapOvr>
+    <a:masterClrMapping/>
+  </p:clrMapOvr>
+</p:notes>
+</file>
+
+<file path=ppt/notesSlides/notesSlide9.xml><?xml version="1.0" encoding="utf-8"?>
+<p:notes xmlns:a="http://schemas.openxmlformats.org/drawingml/2006/main" xmlns:r="http://schemas.openxmlformats.org/officeDocument/2006/relationships" xmlns:p="http://schemas.openxmlformats.org/presentationml/2006/main" showMasterSp="0" showMasterPhAnim="0">
+  <p:cSld>
+    <p:spTree>
+      <p:nvGrpSpPr>
+        <p:cNvPr id="1" name="Shape 139"/>
+        <p:cNvGrpSpPr/>
+        <p:nvPr/>
+      </p:nvGrpSpPr>
+      <p:grpSpPr>
+        <a:xfrm>
+          <a:off x="0" y="0"/>
+          <a:ext cx="0" cy="0"/>
+          <a:chOff x="0" y="0"/>
+          <a:chExt cx="0" cy="0"/>
+        </a:xfrm>
+      </p:grpSpPr>
+      <p:sp>
+        <p:nvSpPr>
+          <p:cNvPr id="140" name="Shape 140"/>
+          <p:cNvSpPr>
+            <a:spLocks noGrp="1" noRot="1" noChangeAspect="1"/>
+          </p:cNvSpPr>
+          <p:nvPr>
+            <p:ph type="sldImg" idx="2"/>
+          </p:nvPr>
+        </p:nvSpPr>
+        <p:spPr>
+          <a:xfrm>
+            <a:off x="381000" y="685800"/>
+            <a:ext cx="6096000" cy="3429000"/>
+          </a:xfrm>
+          <a:custGeom>
+            <a:avLst/>
+            <a:gdLst/>
+            <a:ahLst/>
+            <a:cxnLst/>
+            <a:rect l="0" t="0" r="0" b="0"/>
+            <a:pathLst>
+              <a:path w="120000" h="120000" extrusionOk="0">
+                <a:moveTo>
+                  <a:pt x="0" y="0"/>
+                </a:moveTo>
+                <a:lnTo>
+                  <a:pt x="120000" y="0"/>
+                </a:lnTo>
+                <a:lnTo>
+                  <a:pt x="120000" y="120000"/>
+                </a:lnTo>
+                <a:lnTo>
+                  <a:pt x="0" y="120000"/>
+                </a:lnTo>
+                <a:close/>
+              </a:path>
+            </a:pathLst>
+          </a:custGeom>
+        </p:spPr>
+      </p:sp>
+      <p:sp>
+        <p:nvSpPr>
+          <p:cNvPr id="141" name="Shape 141"/>
+          <p:cNvSpPr txBox="1">
+            <a:spLocks noGrp="1"/>
+          </p:cNvSpPr>
+          <p:nvPr>
+            <p:ph type="body" idx="1"/>
+          </p:nvPr>
+        </p:nvSpPr>
+        <p:spPr>
+          <a:xfrm>
+            <a:off x="685800" y="4343400"/>
+            <a:ext cx="5486400" cy="4114800"/>
+          </a:xfrm>
+          <a:prstGeom prst="rect">
+            <a:avLst/>
+          </a:prstGeom>
+        </p:spPr>
+        <p:txBody>
+          <a:bodyPr spcFirstLastPara="1" wrap="square" lIns="91425" tIns="91425" rIns="91425" bIns="91425" anchor="t" anchorCtr="0">
+            <a:noAutofit/>
+          </a:bodyPr>
+          <a:lstStyle/>
+          <a:p>
+            <a:pPr marL="0" lvl="0" indent="0">
+              <a:spcBef>
+                <a:spcPts val="0"/>
+              </a:spcBef>
+              <a:spcAft>
+                <a:spcPts val="0"/>
+              </a:spcAft>
+              <a:buNone/>
+            </a:pPr>
+            <a:endParaRPr/>
+          </a:p>
+        </p:txBody>
+      </p:sp>
+    </p:spTree>
+    <p:extLst>
+      <p:ext uri="{BB962C8B-B14F-4D97-AF65-F5344CB8AC3E}">
+        <p14:creationId xmlns:p14="http://schemas.microsoft.com/office/powerpoint/2010/main" val="1987211694"/>
       </p:ext>
     </p:extLst>
   </p:cSld>
@@ -13501,10 +13721,6 @@
               </a:rPr>
               <a:t>Arquitectura de la Aplicación</a:t>
             </a:r>
-            <a:endParaRPr lang="es-VE" sz="5400" b="1" dirty="0">
-              <a:latin typeface="Leelawadee UI Semilight" panose="020B0402040204020203" pitchFamily="34" charset="-34"/>
-              <a:cs typeface="Leelawadee UI Semilight" panose="020B0402040204020203" pitchFamily="34" charset="-34"/>
-            </a:endParaRPr>
           </a:p>
         </p:txBody>
       </p:sp>
@@ -13559,6 +13775,160 @@
 </file>
 
 <file path=ppt/slides/slide2.xml><?xml version="1.0" encoding="utf-8"?>
+<p:sld xmlns:a="http://schemas.openxmlformats.org/drawingml/2006/main" xmlns:r="http://schemas.openxmlformats.org/officeDocument/2006/relationships" xmlns:p="http://schemas.openxmlformats.org/presentationml/2006/main">
+  <p:cSld>
+    <p:bg>
+      <p:bgPr>
+        <a:solidFill>
+          <a:srgbClr val="F67031"/>
+        </a:solidFill>
+        <a:effectLst/>
+      </p:bgPr>
+    </p:bg>
+    <p:spTree>
+      <p:nvGrpSpPr>
+        <p:cNvPr id="1" name="Shape 142"/>
+        <p:cNvGrpSpPr/>
+        <p:nvPr/>
+      </p:nvGrpSpPr>
+      <p:grpSpPr>
+        <a:xfrm>
+          <a:off x="0" y="0"/>
+          <a:ext cx="0" cy="0"/>
+          <a:chOff x="0" y="0"/>
+          <a:chExt cx="0" cy="0"/>
+        </a:xfrm>
+      </p:grpSpPr>
+      <p:sp>
+        <p:nvSpPr>
+          <p:cNvPr id="4" name="Rectangle 3"/>
+          <p:cNvSpPr/>
+          <p:nvPr/>
+        </p:nvSpPr>
+        <p:spPr>
+          <a:xfrm>
+            <a:off x="5098473" y="424873"/>
+            <a:ext cx="1985818" cy="886691"/>
+          </a:xfrm>
+          <a:prstGeom prst="rect">
+            <a:avLst/>
+          </a:prstGeom>
+          <a:solidFill>
+            <a:srgbClr val="F67031"/>
+          </a:solidFill>
+          <a:ln>
+            <a:noFill/>
+          </a:ln>
+        </p:spPr>
+        <p:style>
+          <a:lnRef idx="2">
+            <a:schemeClr val="accent1">
+              <a:shade val="50000"/>
+            </a:schemeClr>
+          </a:lnRef>
+          <a:fillRef idx="1">
+            <a:schemeClr val="accent1"/>
+          </a:fillRef>
+          <a:effectRef idx="0">
+            <a:schemeClr val="accent1"/>
+          </a:effectRef>
+          <a:fontRef idx="minor">
+            <a:schemeClr val="lt1"/>
+          </a:fontRef>
+        </p:style>
+        <p:txBody>
+          <a:bodyPr rtlCol="0" anchor="ctr"/>
+          <a:lstStyle/>
+          <a:p>
+            <a:pPr algn="ctr"/>
+            <a:endParaRPr lang="es-VE">
+              <a:solidFill>
+                <a:prstClr val="white"/>
+              </a:solidFill>
+            </a:endParaRPr>
+          </a:p>
+        </p:txBody>
+      </p:sp>
+      <p:sp>
+        <p:nvSpPr>
+          <p:cNvPr id="6" name="TextBox 5"/>
+          <p:cNvSpPr txBox="1"/>
+          <p:nvPr/>
+        </p:nvSpPr>
+        <p:spPr>
+          <a:xfrm>
+            <a:off x="4198586" y="509578"/>
+            <a:ext cx="3715697" cy="646331"/>
+          </a:xfrm>
+          <a:prstGeom prst="rect">
+            <a:avLst/>
+          </a:prstGeom>
+          <a:noFill/>
+        </p:spPr>
+        <p:txBody>
+          <a:bodyPr wrap="none" rtlCol="0">
+            <a:spAutoFit/>
+          </a:bodyPr>
+          <a:lstStyle/>
+          <a:p>
+            <a:r>
+              <a:rPr lang="es-VE" sz="3600" dirty="0">
+                <a:solidFill>
+                  <a:schemeClr val="bg1"/>
+                </a:solidFill>
+                <a:latin typeface="Leelawadee UI" panose="020B0502040204020203" pitchFamily="34" charset="-34"/>
+                <a:cs typeface="Leelawadee UI" panose="020B0502040204020203" pitchFamily="34" charset="-34"/>
+              </a:rPr>
+              <a:t>Modelo de Datos</a:t>
+            </a:r>
+          </a:p>
+        </p:txBody>
+      </p:sp>
+      <p:pic>
+        <p:nvPicPr>
+          <p:cNvPr id="27" name="Picture 26"/>
+          <p:cNvPicPr>
+            <a:picLocks noChangeAspect="1"/>
+          </p:cNvPicPr>
+          <p:nvPr/>
+        </p:nvPicPr>
+        <p:blipFill>
+          <a:blip r:embed="rId3"/>
+          <a:stretch>
+            <a:fillRect/>
+          </a:stretch>
+        </p:blipFill>
+        <p:spPr>
+          <a:xfrm>
+            <a:off x="1385453" y="1759141"/>
+            <a:ext cx="9060874" cy="4988022"/>
+          </a:xfrm>
+          <a:prstGeom prst="rect">
+            <a:avLst/>
+          </a:prstGeom>
+        </p:spPr>
+      </p:pic>
+    </p:spTree>
+    <p:extLst>
+      <p:ext uri="{BB962C8B-B14F-4D97-AF65-F5344CB8AC3E}">
+        <p14:creationId xmlns:p14="http://schemas.microsoft.com/office/powerpoint/2010/main" val="1133692042"/>
+      </p:ext>
+    </p:extLst>
+  </p:cSld>
+  <p:clrMapOvr>
+    <a:masterClrMapping/>
+  </p:clrMapOvr>
+  <p:timing>
+    <p:tnLst>
+      <p:par>
+        <p:cTn id="1" dur="indefinite" restart="never" nodeType="tmRoot"/>
+      </p:par>
+    </p:tnLst>
+  </p:timing>
+</p:sld>
+</file>
+
+<file path=ppt/slides/slide3.xml><?xml version="1.0" encoding="utf-8"?>
 <p:sld xmlns:a="http://schemas.openxmlformats.org/drawingml/2006/main" xmlns:r="http://schemas.openxmlformats.org/officeDocument/2006/relationships" xmlns:p="http://schemas.openxmlformats.org/presentationml/2006/main">
   <p:cSld>
     <p:bg>
@@ -14267,7 +14637,7 @@
 </p:sld>
 </file>
 
-<file path=ppt/slides/slide3.xml><?xml version="1.0" encoding="utf-8"?>
+<file path=ppt/slides/slide4.xml><?xml version="1.0" encoding="utf-8"?>
 <p:sld xmlns:a="http://schemas.openxmlformats.org/drawingml/2006/main" xmlns:r="http://schemas.openxmlformats.org/officeDocument/2006/relationships" xmlns:p="http://schemas.openxmlformats.org/presentationml/2006/main">
   <p:cSld>
     <p:bg>
@@ -14415,7 +14785,7 @@
 </p:sld>
 </file>
 
-<file path=ppt/slides/slide4.xml><?xml version="1.0" encoding="utf-8"?>
+<file path=ppt/slides/slide5.xml><?xml version="1.0" encoding="utf-8"?>
 <p:sld xmlns:a="http://schemas.openxmlformats.org/drawingml/2006/main" xmlns:r="http://schemas.openxmlformats.org/officeDocument/2006/relationships" xmlns:p="http://schemas.openxmlformats.org/presentationml/2006/main">
   <p:cSld>
     <p:bg>
@@ -14554,7 +14924,7 @@
 </p:sld>
 </file>
 
-<file path=ppt/slides/slide5.xml><?xml version="1.0" encoding="utf-8"?>
+<file path=ppt/slides/slide6.xml><?xml version="1.0" encoding="utf-8"?>
 <p:sld xmlns:a="http://schemas.openxmlformats.org/drawingml/2006/main" xmlns:r="http://schemas.openxmlformats.org/officeDocument/2006/relationships" xmlns:p="http://schemas.openxmlformats.org/presentationml/2006/main">
   <p:cSld>
     <p:bg>
@@ -14687,7 +15057,7 @@
 </p:sld>
 </file>
 
-<file path=ppt/slides/slide6.xml><?xml version="1.0" encoding="utf-8"?>
+<file path=ppt/slides/slide7.xml><?xml version="1.0" encoding="utf-8"?>
 <p:sld xmlns:a="http://schemas.openxmlformats.org/drawingml/2006/main" xmlns:r="http://schemas.openxmlformats.org/officeDocument/2006/relationships" xmlns:p="http://schemas.openxmlformats.org/presentationml/2006/main">
   <p:cSld>
     <p:bg>
@@ -14826,7 +15196,7 @@
 </p:sld>
 </file>
 
-<file path=ppt/slides/slide7.xml><?xml version="1.0" encoding="utf-8"?>
+<file path=ppt/slides/slide8.xml><?xml version="1.0" encoding="utf-8"?>
 <p:sld xmlns:a="http://schemas.openxmlformats.org/drawingml/2006/main" xmlns:r="http://schemas.openxmlformats.org/officeDocument/2006/relationships" xmlns:p="http://schemas.openxmlformats.org/presentationml/2006/main">
   <p:cSld>
     <p:bg>
@@ -14909,8 +15279,8 @@
         </p:nvSpPr>
         <p:spPr>
           <a:xfrm>
-            <a:off x="4198586" y="509578"/>
-            <a:ext cx="3715697" cy="646331"/>
+            <a:off x="3619936" y="545052"/>
+            <a:ext cx="4942892" cy="646331"/>
           </a:xfrm>
           <a:prstGeom prst="rect">
             <a:avLst/>
@@ -14926,34 +15296,85 @@
             <a:r>
               <a:rPr lang="es-VE" sz="3600" dirty="0">
                 <a:solidFill>
-                  <a:schemeClr val="bg1"/>
+                  <a:prstClr val="white"/>
                 </a:solidFill>
                 <a:latin typeface="Leelawadee UI" panose="020B0502040204020203" pitchFamily="34" charset="-34"/>
                 <a:cs typeface="Leelawadee UI" panose="020B0502040204020203" pitchFamily="34" charset="-34"/>
               </a:rPr>
-              <a:t>Modelo de Datos</a:t>
+              <a:t>Modelo de </a:t>
             </a:r>
+            <a:r>
+              <a:rPr lang="es-VE" sz="3600" dirty="0" smtClean="0">
+                <a:solidFill>
+                  <a:prstClr val="white"/>
+                </a:solidFill>
+                <a:latin typeface="Leelawadee UI" panose="020B0502040204020203" pitchFamily="34" charset="-34"/>
+                <a:cs typeface="Leelawadee UI" panose="020B0502040204020203" pitchFamily="34" charset="-34"/>
+              </a:rPr>
+              <a:t>Navegación</a:t>
+            </a:r>
+            <a:endParaRPr lang="es-VE" sz="3600" dirty="0">
+              <a:solidFill>
+                <a:prstClr val="white"/>
+              </a:solidFill>
+              <a:latin typeface="Leelawadee UI" panose="020B0502040204020203" pitchFamily="34" charset="-34"/>
+              <a:cs typeface="Leelawadee UI" panose="020B0502040204020203" pitchFamily="34" charset="-34"/>
+            </a:endParaRPr>
           </a:p>
         </p:txBody>
       </p:sp>
       <p:pic>
         <p:nvPicPr>
-          <p:cNvPr id="27" name="Picture 26"/>
+          <p:cNvPr id="5" name="Picture 4"/>
           <p:cNvPicPr>
             <a:picLocks noChangeAspect="1"/>
           </p:cNvPicPr>
           <p:nvPr/>
         </p:nvPicPr>
-        <p:blipFill>
-          <a:blip r:embed="rId3"/>
-          <a:stretch>
-            <a:fillRect/>
-          </a:stretch>
+        <p:blipFill rotWithShape="1">
+          <a:blip r:embed="rId3" cstate="print">
+            <a:extLst>
+              <a:ext uri="{28A0092B-C50C-407E-A947-70E740481C1C}">
+                <a14:useLocalDpi xmlns:a14="http://schemas.microsoft.com/office/drawing/2010/main" val="0"/>
+              </a:ext>
+            </a:extLst>
+          </a:blip>
+          <a:srcRect r="49906" b="50563"/>
+          <a:stretch/>
         </p:blipFill>
         <p:spPr>
           <a:xfrm>
-            <a:off x="1385453" y="1759141"/>
-            <a:ext cx="9060874" cy="4988022"/>
+            <a:off x="697374" y="1981218"/>
+            <a:ext cx="10788015" cy="2008167"/>
+          </a:xfrm>
+          <a:prstGeom prst="rect">
+            <a:avLst/>
+          </a:prstGeom>
+        </p:spPr>
+      </p:pic>
+      <p:pic>
+        <p:nvPicPr>
+          <p:cNvPr id="7" name="Picture 6"/>
+          <p:cNvPicPr>
+            <a:picLocks noChangeAspect="1"/>
+          </p:cNvPicPr>
+          <p:nvPr/>
+        </p:nvPicPr>
+        <p:blipFill rotWithShape="1">
+          <a:blip r:embed="rId3" cstate="print">
+            <a:extLst>
+              <a:ext uri="{28A0092B-C50C-407E-A947-70E740481C1C}">
+                <a14:useLocalDpi xmlns:a14="http://schemas.microsoft.com/office/drawing/2010/main" val="0"/>
+              </a:ext>
+            </a:extLst>
+          </a:blip>
+          <a:srcRect l="50265" b="50765"/>
+          <a:stretch/>
+        </p:blipFill>
+        <p:spPr>
+          <a:xfrm>
+            <a:off x="697374" y="4381517"/>
+            <a:ext cx="10788015" cy="2008167"/>
           </a:xfrm>
           <a:prstGeom prst="rect">
             <a:avLst/>
@@ -14963,7 +15384,183 @@
     </p:spTree>
     <p:extLst>
       <p:ext uri="{BB962C8B-B14F-4D97-AF65-F5344CB8AC3E}">
-        <p14:creationId xmlns:p14="http://schemas.microsoft.com/office/powerpoint/2010/main" val="1133692042"/>
+        <p14:creationId xmlns:p14="http://schemas.microsoft.com/office/powerpoint/2010/main" val="3752916943"/>
+      </p:ext>
+    </p:extLst>
+  </p:cSld>
+  <p:clrMapOvr>
+    <a:masterClrMapping/>
+  </p:clrMapOvr>
+  <p:timing>
+    <p:tnLst>
+      <p:par>
+        <p:cTn id="1" dur="indefinite" restart="never" nodeType="tmRoot"/>
+      </p:par>
+    </p:tnLst>
+  </p:timing>
+</p:sld>
+</file>
+
+<file path=ppt/slides/slide9.xml><?xml version="1.0" encoding="utf-8"?>
+<p:sld xmlns:a="http://schemas.openxmlformats.org/drawingml/2006/main" xmlns:r="http://schemas.openxmlformats.org/officeDocument/2006/relationships" xmlns:p="http://schemas.openxmlformats.org/presentationml/2006/main">
+  <p:cSld>
+    <p:bg>
+      <p:bgPr>
+        <a:solidFill>
+          <a:srgbClr val="F67031"/>
+        </a:solidFill>
+        <a:effectLst/>
+      </p:bgPr>
+    </p:bg>
+    <p:spTree>
+      <p:nvGrpSpPr>
+        <p:cNvPr id="1" name="Shape 142"/>
+        <p:cNvGrpSpPr/>
+        <p:nvPr/>
+      </p:nvGrpSpPr>
+      <p:grpSpPr>
+        <a:xfrm>
+          <a:off x="0" y="0"/>
+          <a:ext cx="0" cy="0"/>
+          <a:chOff x="0" y="0"/>
+          <a:chExt cx="0" cy="0"/>
+        </a:xfrm>
+      </p:grpSpPr>
+      <p:sp>
+        <p:nvSpPr>
+          <p:cNvPr id="4" name="Rectangle 3"/>
+          <p:cNvSpPr/>
+          <p:nvPr/>
+        </p:nvSpPr>
+        <p:spPr>
+          <a:xfrm>
+            <a:off x="5098473" y="424873"/>
+            <a:ext cx="1985818" cy="886691"/>
+          </a:xfrm>
+          <a:prstGeom prst="rect">
+            <a:avLst/>
+          </a:prstGeom>
+          <a:solidFill>
+            <a:srgbClr val="F67031"/>
+          </a:solidFill>
+          <a:ln>
+            <a:noFill/>
+          </a:ln>
+        </p:spPr>
+        <p:style>
+          <a:lnRef idx="2">
+            <a:schemeClr val="accent1">
+              <a:shade val="50000"/>
+            </a:schemeClr>
+          </a:lnRef>
+          <a:fillRef idx="1">
+            <a:schemeClr val="accent1"/>
+          </a:fillRef>
+          <a:effectRef idx="0">
+            <a:schemeClr val="accent1"/>
+          </a:effectRef>
+          <a:fontRef idx="minor">
+            <a:schemeClr val="lt1"/>
+          </a:fontRef>
+        </p:style>
+        <p:txBody>
+          <a:bodyPr rtlCol="0" anchor="ctr"/>
+          <a:lstStyle/>
+          <a:p>
+            <a:pPr algn="ctr"/>
+            <a:endParaRPr lang="es-VE">
+              <a:solidFill>
+                <a:prstClr val="white"/>
+              </a:solidFill>
+            </a:endParaRPr>
+          </a:p>
+        </p:txBody>
+      </p:sp>
+      <p:sp>
+        <p:nvSpPr>
+          <p:cNvPr id="5" name="TextBox 4"/>
+          <p:cNvSpPr txBox="1"/>
+          <p:nvPr/>
+        </p:nvSpPr>
+        <p:spPr>
+          <a:xfrm>
+            <a:off x="3619936" y="545052"/>
+            <a:ext cx="4942892" cy="646331"/>
+          </a:xfrm>
+          <a:prstGeom prst="rect">
+            <a:avLst/>
+          </a:prstGeom>
+          <a:noFill/>
+        </p:spPr>
+        <p:txBody>
+          <a:bodyPr wrap="none" rtlCol="0">
+            <a:spAutoFit/>
+          </a:bodyPr>
+          <a:lstStyle/>
+          <a:p>
+            <a:r>
+              <a:rPr lang="es-VE" sz="3600" dirty="0">
+                <a:solidFill>
+                  <a:prstClr val="white"/>
+                </a:solidFill>
+                <a:latin typeface="Leelawadee UI" panose="020B0502040204020203" pitchFamily="34" charset="-34"/>
+                <a:cs typeface="Leelawadee UI" panose="020B0502040204020203" pitchFamily="34" charset="-34"/>
+              </a:rPr>
+              <a:t>Modelo de </a:t>
+            </a:r>
+            <a:r>
+              <a:rPr lang="es-VE" sz="3600" dirty="0" smtClean="0">
+                <a:solidFill>
+                  <a:prstClr val="white"/>
+                </a:solidFill>
+                <a:latin typeface="Leelawadee UI" panose="020B0502040204020203" pitchFamily="34" charset="-34"/>
+                <a:cs typeface="Leelawadee UI" panose="020B0502040204020203" pitchFamily="34" charset="-34"/>
+              </a:rPr>
+              <a:t>Navegación</a:t>
+            </a:r>
+            <a:endParaRPr lang="es-VE" sz="3600" dirty="0">
+              <a:solidFill>
+                <a:prstClr val="white"/>
+              </a:solidFill>
+              <a:latin typeface="Leelawadee UI" panose="020B0502040204020203" pitchFamily="34" charset="-34"/>
+              <a:cs typeface="Leelawadee UI" panose="020B0502040204020203" pitchFamily="34" charset="-34"/>
+            </a:endParaRPr>
+          </a:p>
+        </p:txBody>
+      </p:sp>
+      <p:pic>
+        <p:nvPicPr>
+          <p:cNvPr id="7" name="Picture 6"/>
+          <p:cNvPicPr>
+            <a:picLocks noChangeAspect="1"/>
+          </p:cNvPicPr>
+          <p:nvPr/>
+        </p:nvPicPr>
+        <p:blipFill rotWithShape="1">
+          <a:blip r:embed="rId3" cstate="print">
+            <a:extLst>
+              <a:ext uri="{28A0092B-C50C-407E-A947-70E740481C1C}">
+                <a14:useLocalDpi xmlns:a14="http://schemas.microsoft.com/office/drawing/2010/main" val="0"/>
+              </a:ext>
+            </a:extLst>
+          </a:blip>
+          <a:srcRect l="31628" t="50188" r="32712"/>
+          <a:stretch/>
+        </p:blipFill>
+        <p:spPr>
+          <a:xfrm>
+            <a:off x="458333" y="2484409"/>
+            <a:ext cx="11266097" cy="3095095"/>
+          </a:xfrm>
+          <a:prstGeom prst="rect">
+            <a:avLst/>
+          </a:prstGeom>
+        </p:spPr>
+      </p:pic>
+    </p:spTree>
+    <p:extLst>
+      <p:ext uri="{BB962C8B-B14F-4D97-AF65-F5344CB8AC3E}">
+        <p14:creationId xmlns:p14="http://schemas.microsoft.com/office/powerpoint/2010/main" val="3576483914"/>
       </p:ext>
     </p:extLst>
   </p:cSld>

</xml_diff>